<commit_message>
Added final WSB figure
</commit_message>
<xml_diff>
--- a/dfo_repro_research/ReproResearch/presentation/markdown-intro.pptx
+++ b/dfo_repro_research/ReproResearch/presentation/markdown-intro.pptx
@@ -5,16 +5,17 @@
     <p:sldMasterId id="2147483648" r:id="rId1"/>
   </p:sldMasterIdLst>
   <p:notesMasterIdLst>
-    <p:notesMasterId r:id="rId9"/>
+    <p:notesMasterId r:id="rId10"/>
   </p:notesMasterIdLst>
   <p:sldIdLst>
     <p:sldId id="257" r:id="rId2"/>
     <p:sldId id="258" r:id="rId3"/>
     <p:sldId id="259" r:id="rId4"/>
     <p:sldId id="260" r:id="rId5"/>
-    <p:sldId id="261" r:id="rId6"/>
-    <p:sldId id="262" r:id="rId7"/>
-    <p:sldId id="263" r:id="rId8"/>
+    <p:sldId id="264" r:id="rId6"/>
+    <p:sldId id="261" r:id="rId7"/>
+    <p:sldId id="262" r:id="rId8"/>
+    <p:sldId id="263" r:id="rId9"/>
   </p:sldIdLst>
   <p:sldSz cx="12192000" cy="6858000"/>
   <p:notesSz cx="6858000" cy="9144000"/>
@@ -115,7 +116,18 @@
   </p:defaultTextStyle>
   <p:extLst>
     <p:ext uri="{EFAFB233-063F-42B5-8137-9DF3F51BA10A}">
-      <p15:sldGuideLst xmlns:p15="http://schemas.microsoft.com/office/powerpoint/2012/main" xmlns=""/>
+      <p15:sldGuideLst xmlns:p15="http://schemas.microsoft.com/office/powerpoint/2012/main">
+        <p15:guide id="1" orient="horz" pos="2160">
+          <p15:clr>
+            <a:srgbClr val="A4A3A4"/>
+          </p15:clr>
+        </p15:guide>
+        <p15:guide id="2" pos="3840">
+          <p15:clr>
+            <a:srgbClr val="A4A3A4"/>
+          </p15:clr>
+        </p15:guide>
+      </p15:sldGuideLst>
     </p:ext>
   </p:extLst>
 </p:presentation>
@@ -207,7 +219,7 @@
           <a:p>
             <a:fld id="{5142AD51-0E8C-4A3D-AC38-1AAC6FC45305}" type="datetimeFigureOut">
               <a:rPr lang="en-CA" smtClean="0"/>
-              <a:t>17/11/2017</a:t>
+              <a:t>2017-11-20</a:t>
             </a:fld>
             <a:endParaRPr lang="en-CA"/>
           </a:p>
@@ -792,7 +804,7 @@
           <a:p>
             <a:fld id="{898EA363-2843-4698-A3A9-8782207EA7F9}" type="datetimeFigureOut">
               <a:rPr lang="en-CA" smtClean="0"/>
-              <a:t>17/11/2017</a:t>
+              <a:t>2017-11-20</a:t>
             </a:fld>
             <a:endParaRPr lang="en-CA"/>
           </a:p>
@@ -962,7 +974,7 @@
           <a:p>
             <a:fld id="{898EA363-2843-4698-A3A9-8782207EA7F9}" type="datetimeFigureOut">
               <a:rPr lang="en-CA" smtClean="0"/>
-              <a:t>17/11/2017</a:t>
+              <a:t>2017-11-20</a:t>
             </a:fld>
             <a:endParaRPr lang="en-CA"/>
           </a:p>
@@ -1142,7 +1154,7 @@
           <a:p>
             <a:fld id="{898EA363-2843-4698-A3A9-8782207EA7F9}" type="datetimeFigureOut">
               <a:rPr lang="en-CA" smtClean="0"/>
-              <a:t>17/11/2017</a:t>
+              <a:t>2017-11-20</a:t>
             </a:fld>
             <a:endParaRPr lang="en-CA"/>
           </a:p>
@@ -1312,7 +1324,7 @@
           <a:p>
             <a:fld id="{898EA363-2843-4698-A3A9-8782207EA7F9}" type="datetimeFigureOut">
               <a:rPr lang="en-CA" smtClean="0"/>
-              <a:t>17/11/2017</a:t>
+              <a:t>2017-11-20</a:t>
             </a:fld>
             <a:endParaRPr lang="en-CA"/>
           </a:p>
@@ -1558,7 +1570,7 @@
           <a:p>
             <a:fld id="{898EA363-2843-4698-A3A9-8782207EA7F9}" type="datetimeFigureOut">
               <a:rPr lang="en-CA" smtClean="0"/>
-              <a:t>17/11/2017</a:t>
+              <a:t>2017-11-20</a:t>
             </a:fld>
             <a:endParaRPr lang="en-CA"/>
           </a:p>
@@ -1790,7 +1802,7 @@
           <a:p>
             <a:fld id="{898EA363-2843-4698-A3A9-8782207EA7F9}" type="datetimeFigureOut">
               <a:rPr lang="en-CA" smtClean="0"/>
-              <a:t>17/11/2017</a:t>
+              <a:t>2017-11-20</a:t>
             </a:fld>
             <a:endParaRPr lang="en-CA"/>
           </a:p>
@@ -2157,7 +2169,7 @@
           <a:p>
             <a:fld id="{898EA363-2843-4698-A3A9-8782207EA7F9}" type="datetimeFigureOut">
               <a:rPr lang="en-CA" smtClean="0"/>
-              <a:t>17/11/2017</a:t>
+              <a:t>2017-11-20</a:t>
             </a:fld>
             <a:endParaRPr lang="en-CA"/>
           </a:p>
@@ -2275,7 +2287,7 @@
           <a:p>
             <a:fld id="{898EA363-2843-4698-A3A9-8782207EA7F9}" type="datetimeFigureOut">
               <a:rPr lang="en-CA" smtClean="0"/>
-              <a:t>17/11/2017</a:t>
+              <a:t>2017-11-20</a:t>
             </a:fld>
             <a:endParaRPr lang="en-CA"/>
           </a:p>
@@ -2370,7 +2382,7 @@
           <a:p>
             <a:fld id="{898EA363-2843-4698-A3A9-8782207EA7F9}" type="datetimeFigureOut">
               <a:rPr lang="en-CA" smtClean="0"/>
-              <a:t>17/11/2017</a:t>
+              <a:t>2017-11-20</a:t>
             </a:fld>
             <a:endParaRPr lang="en-CA"/>
           </a:p>
@@ -2647,7 +2659,7 @@
           <a:p>
             <a:fld id="{898EA363-2843-4698-A3A9-8782207EA7F9}" type="datetimeFigureOut">
               <a:rPr lang="en-CA" smtClean="0"/>
-              <a:t>17/11/2017</a:t>
+              <a:t>2017-11-20</a:t>
             </a:fld>
             <a:endParaRPr lang="en-CA"/>
           </a:p>
@@ -2900,7 +2912,7 @@
           <a:p>
             <a:fld id="{898EA363-2843-4698-A3A9-8782207EA7F9}" type="datetimeFigureOut">
               <a:rPr lang="en-CA" smtClean="0"/>
-              <a:t>17/11/2017</a:t>
+              <a:t>2017-11-20</a:t>
             </a:fld>
             <a:endParaRPr lang="en-CA"/>
           </a:p>
@@ -3113,7 +3125,7 @@
           <a:p>
             <a:fld id="{898EA363-2843-4698-A3A9-8782207EA7F9}" type="datetimeFigureOut">
               <a:rPr lang="en-CA" smtClean="0"/>
-              <a:t>17/11/2017</a:t>
+              <a:t>2017-11-20</a:t>
             </a:fld>
             <a:endParaRPr lang="en-CA"/>
           </a:p>
@@ -6562,10 +6574,9 @@
             </a:p>
             <a:p>
               <a:r>
-                <a:rPr lang="en-US" sz="1600" dirty="0" smtClean="0"/>
+                <a:rPr lang="en-US" sz="1600" dirty="0"/>
                 <a:t>One files for scripts</a:t>
               </a:r>
-              <a:endParaRPr lang="en-US" sz="1600" dirty="0"/>
             </a:p>
             <a:p>
               <a:r>
@@ -7646,10 +7657,9 @@
             </a:p>
             <a:p>
               <a:r>
-                <a:rPr lang="en-US" dirty="0" smtClean="0"/>
+                <a:rPr lang="en-US" dirty="0"/>
                 <a:t>Multiple files for scripts</a:t>
               </a:r>
-              <a:endParaRPr lang="en-US" dirty="0"/>
             </a:p>
             <a:p>
               <a:r>
@@ -7730,28 +7740,27 @@
             <a:lstStyle/>
             <a:p>
               <a:r>
-                <a:rPr lang="en-US" sz="1600" dirty="0" smtClean="0"/>
+                <a:rPr lang="en-US" sz="1600" dirty="0"/>
                 <a:t>Dynamic Document</a:t>
               </a:r>
             </a:p>
             <a:p>
               <a:r>
-                <a:rPr lang="en-US" sz="1600" dirty="0" smtClean="0"/>
+                <a:rPr lang="en-US" sz="1600" dirty="0"/>
                 <a:t>Markdown</a:t>
               </a:r>
-              <a:endParaRPr lang="en-US" sz="1600" dirty="0"/>
             </a:p>
             <a:p>
               <a:r>
-                <a:rPr lang="en-US" sz="1600" dirty="0" err="1" smtClean="0"/>
+                <a:rPr lang="en-US" sz="1600" dirty="0" err="1"/>
                 <a:t>LaTeX</a:t>
               </a:r>
               <a:r>
-                <a:rPr lang="en-US" sz="1600" dirty="0" smtClean="0"/>
+                <a:rPr lang="en-US" sz="1600" dirty="0"/>
                 <a:t>/</a:t>
               </a:r>
               <a:r>
-                <a:rPr lang="en-US" sz="1600" dirty="0" err="1" smtClean="0"/>
+                <a:rPr lang="en-US" sz="1600" dirty="0" err="1"/>
                 <a:t>LyX</a:t>
               </a:r>
               <a:endParaRPr lang="en-US" sz="1600" dirty="0"/>
@@ -8910,10 +8919,9 @@
           <a:lstStyle/>
           <a:p>
             <a:r>
-              <a:rPr lang="en-CA" dirty="0" smtClean="0"/>
+              <a:rPr lang="en-CA" dirty="0"/>
               <a:t>Version Control for files!!</a:t>
             </a:r>
-            <a:endParaRPr lang="en-CA" dirty="0"/>
           </a:p>
         </p:txBody>
       </p:sp>
@@ -9234,6 +9242,71 @@
 </file>
 
 <file path=ppt/slides/slide5.xml><?xml version="1.0" encoding="utf-8"?>
+<p:sld xmlns:a="http://schemas.openxmlformats.org/drawingml/2006/main" xmlns:r="http://schemas.openxmlformats.org/officeDocument/2006/relationships" xmlns:p="http://schemas.openxmlformats.org/presentationml/2006/main">
+  <p:cSld>
+    <p:spTree>
+      <p:nvGrpSpPr>
+        <p:cNvPr id="1" name=""/>
+        <p:cNvGrpSpPr/>
+        <p:nvPr/>
+      </p:nvGrpSpPr>
+      <p:grpSpPr>
+        <a:xfrm>
+          <a:off x="0" y="0"/>
+          <a:ext cx="0" cy="0"/>
+          <a:chOff x="0" y="0"/>
+          <a:chExt cx="0" cy="0"/>
+        </a:xfrm>
+      </p:grpSpPr>
+      <p:pic>
+        <p:nvPicPr>
+          <p:cNvPr id="3" name="Picture 2">
+            <a:extLst>
+              <a:ext uri="{FF2B5EF4-FFF2-40B4-BE49-F238E27FC236}">
+                <a16:creationId xmlns:a16="http://schemas.microsoft.com/office/drawing/2014/main" id="{CB914686-7A7B-42D9-ACB1-85384F942CAF}"/>
+              </a:ext>
+            </a:extLst>
+          </p:cNvPr>
+          <p:cNvPicPr>
+            <a:picLocks noChangeAspect="1"/>
+          </p:cNvPicPr>
+          <p:nvPr/>
+        </p:nvPicPr>
+        <p:blipFill rotWithShape="1">
+          <a:blip r:embed="rId2">
+            <a:extLst>
+              <a:ext uri="{28A0092B-C50C-407E-A947-70E740481C1C}">
+                <a14:useLocalDpi xmlns:a14="http://schemas.microsoft.com/office/drawing/2010/main" val="0"/>
+              </a:ext>
+            </a:extLst>
+          </a:blip>
+          <a:srcRect t="19747" b="26413"/>
+          <a:stretch/>
+        </p:blipFill>
+        <p:spPr>
+          <a:xfrm>
+            <a:off x="2096024" y="52086"/>
+            <a:ext cx="8874391" cy="6753828"/>
+          </a:xfrm>
+          <a:prstGeom prst="rect">
+            <a:avLst/>
+          </a:prstGeom>
+        </p:spPr>
+      </p:pic>
+    </p:spTree>
+    <p:extLst>
+      <p:ext uri="{BB962C8B-B14F-4D97-AF65-F5344CB8AC3E}">
+        <p14:creationId xmlns:p14="http://schemas.microsoft.com/office/powerpoint/2010/main" val="2096996740"/>
+      </p:ext>
+    </p:extLst>
+  </p:cSld>
+  <p:clrMapOvr>
+    <a:masterClrMapping/>
+  </p:clrMapOvr>
+</p:sld>
+</file>
+
+<file path=ppt/slides/slide6.xml><?xml version="1.0" encoding="utf-8"?>
 <p:sld xmlns:a="http://schemas.openxmlformats.org/drawingml/2006/main" xmlns:r="http://schemas.openxmlformats.org/officeDocument/2006/relationships" xmlns:p="http://schemas.openxmlformats.org/presentationml/2006/main">
   <p:cSld>
     <p:spTree>
@@ -9685,7 +9758,7 @@
 </p:sld>
 </file>
 
-<file path=ppt/slides/slide6.xml><?xml version="1.0" encoding="utf-8"?>
+<file path=ppt/slides/slide7.xml><?xml version="1.0" encoding="utf-8"?>
 <p:sld xmlns:a="http://schemas.openxmlformats.org/drawingml/2006/main" xmlns:r="http://schemas.openxmlformats.org/officeDocument/2006/relationships" xmlns:p="http://schemas.openxmlformats.org/presentationml/2006/main">
   <p:cSld>
     <p:spTree>
@@ -9892,7 +9965,7 @@
 </p:sld>
 </file>
 
-<file path=ppt/slides/slide7.xml><?xml version="1.0" encoding="utf-8"?>
+<file path=ppt/slides/slide8.xml><?xml version="1.0" encoding="utf-8"?>
 <p:sld xmlns:a="http://schemas.openxmlformats.org/drawingml/2006/main" xmlns:r="http://schemas.openxmlformats.org/officeDocument/2006/relationships" xmlns:p="http://schemas.openxmlformats.org/presentationml/2006/main">
   <p:cSld>
     <p:spTree>
@@ -10305,7 +10378,7 @@
   <a:extraClrSchemeLst/>
   <a:extLst>
     <a:ext uri="{05A4C25C-085E-4340-85A3-A5531E510DB2}">
-      <thm15:themeFamily xmlns:thm15="http://schemas.microsoft.com/office/thememl/2012/main" xmlns="" name="Office Theme" id="{62F939B6-93AF-4DB8-9C6B-D6C7DFDC589F}" vid="{4A3C46E8-61CC-4603-A589-7422A47A8E4A}"/>
+      <thm15:themeFamily xmlns:thm15="http://schemas.microsoft.com/office/thememl/2012/main" name="Office Theme" id="{62F939B6-93AF-4DB8-9C6B-D6C7DFDC589F}" vid="{4A3C46E8-61CC-4603-A589-7422A47A8E4A}"/>
     </a:ext>
   </a:extLst>
 </a:theme>
@@ -10566,7 +10639,7 @@
   <a:extraClrSchemeLst/>
   <a:extLst>
     <a:ext uri="{05A4C25C-085E-4340-85A3-A5531E510DB2}">
-      <thm15:themeFamily xmlns:thm15="http://schemas.microsoft.com/office/thememl/2012/main" xmlns="" name="Office Theme" id="{62F939B6-93AF-4DB8-9C6B-D6C7DFDC589F}" vid="{4A3C46E8-61CC-4603-A589-7422A47A8E4A}"/>
+      <thm15:themeFamily xmlns:thm15="http://schemas.microsoft.com/office/thememl/2012/main" name="Office Theme" id="{62F939B6-93AF-4DB8-9C6B-D6C7DFDC589F}" vid="{4A3C46E8-61CC-4603-A589-7422A47A8E4A}"/>
     </a:ext>
   </a:extLst>
 </a:theme>

</xml_diff>